<commit_message>
Update PPP & Ziele
</commit_message>
<xml_diff>
--- a/_Organisation/Präsentation/Voodoo_PP1.pptx
+++ b/_Organisation/Präsentation/Voodoo_PP1.pptx
@@ -577,6 +577,482 @@
     <p:extLst>
       <p:ext uri="{BB962C8B-B14F-4D97-AF65-F5344CB8AC3E}">
         <p14:creationId xmlns:p14="http://schemas.microsoft.com/office/powerpoint/2010/main" val="831309496"/>
+      </p:ext>
+    </p:extLst>
+  </p:cSld>
+  <p:clrMapOvr>
+    <a:masterClrMapping/>
+  </p:clrMapOvr>
+</p:notes>
+</file>
+
+<file path=ppt/notesSlides/notesSlide2.xml><?xml version="1.0" encoding="utf-8"?>
+<p:notes xmlns:a="http://schemas.openxmlformats.org/drawingml/2006/main" xmlns:r="http://schemas.openxmlformats.org/officeDocument/2006/relationships" xmlns:p="http://schemas.openxmlformats.org/presentationml/2006/main">
+  <p:cSld>
+    <p:spTree>
+      <p:nvGrpSpPr>
+        <p:cNvPr id="1" name=""/>
+        <p:cNvGrpSpPr/>
+        <p:nvPr/>
+      </p:nvGrpSpPr>
+      <p:grpSpPr>
+        <a:xfrm>
+          <a:off x="0" y="0"/>
+          <a:ext cx="0" cy="0"/>
+          <a:chOff x="0" y="0"/>
+          <a:chExt cx="0" cy="0"/>
+        </a:xfrm>
+      </p:grpSpPr>
+      <p:sp>
+        <p:nvSpPr>
+          <p:cNvPr id="2" name="Folienbildplatzhalter 1"/>
+          <p:cNvSpPr>
+            <a:spLocks noGrp="1" noRot="1" noChangeAspect="1"/>
+          </p:cNvSpPr>
+          <p:nvPr>
+            <p:ph type="sldImg"/>
+          </p:nvPr>
+        </p:nvSpPr>
+        <p:spPr/>
+      </p:sp>
+      <p:sp>
+        <p:nvSpPr>
+          <p:cNvPr id="3" name="Notizenplatzhalter 2"/>
+          <p:cNvSpPr>
+            <a:spLocks noGrp="1"/>
+          </p:cNvSpPr>
+          <p:nvPr>
+            <p:ph type="body" idx="1"/>
+          </p:nvPr>
+        </p:nvSpPr>
+        <p:spPr/>
+        <p:txBody>
+          <a:bodyPr/>
+          <a:lstStyle/>
+          <a:p>
+            <a:r>
+              <a:rPr lang="en-US" dirty="0" err="1" smtClean="0"/>
+              <a:t>Wir</a:t>
+            </a:r>
+            <a:r>
+              <a:rPr lang="en-US" dirty="0" smtClean="0"/>
+              <a:t> </a:t>
+            </a:r>
+            <a:r>
+              <a:rPr lang="en-US" dirty="0" err="1" smtClean="0"/>
+              <a:t>hatten</a:t>
+            </a:r>
+            <a:r>
+              <a:rPr lang="en-US" dirty="0" smtClean="0"/>
+              <a:t> </a:t>
+            </a:r>
+            <a:r>
+              <a:rPr lang="en-US" dirty="0" err="1" smtClean="0"/>
+              <a:t>anfangs</a:t>
+            </a:r>
+            <a:r>
+              <a:rPr lang="en-US" dirty="0" smtClean="0"/>
+              <a:t> </a:t>
+            </a:r>
+            <a:r>
+              <a:rPr lang="en-US" dirty="0" err="1" smtClean="0"/>
+              <a:t>Schwierigkeiten</a:t>
+            </a:r>
+            <a:r>
+              <a:rPr lang="en-US" baseline="0" dirty="0" smtClean="0"/>
+              <a:t> </a:t>
+            </a:r>
+            <a:r>
+              <a:rPr lang="en-US" baseline="0" dirty="0" err="1" smtClean="0"/>
+              <a:t>mit</a:t>
+            </a:r>
+            <a:r>
+              <a:rPr lang="en-US" baseline="0" dirty="0" smtClean="0"/>
+              <a:t> der </a:t>
+            </a:r>
+            <a:r>
+              <a:rPr lang="en-US" baseline="0" dirty="0" err="1" smtClean="0"/>
+              <a:t>Kommunikation</a:t>
+            </a:r>
+            <a:r>
+              <a:rPr lang="en-US" baseline="0" dirty="0" smtClean="0"/>
+              <a:t>, </a:t>
+            </a:r>
+            <a:r>
+              <a:rPr lang="en-US" baseline="0" dirty="0" err="1" smtClean="0"/>
+              <a:t>jedoch</a:t>
+            </a:r>
+            <a:r>
+              <a:rPr lang="en-US" baseline="0" dirty="0" smtClean="0"/>
+              <a:t> </a:t>
+            </a:r>
+            <a:r>
+              <a:rPr lang="en-US" baseline="0" dirty="0" err="1" smtClean="0"/>
+              <a:t>haben</a:t>
+            </a:r>
+            <a:r>
+              <a:rPr lang="en-US" baseline="0" dirty="0" smtClean="0"/>
+              <a:t> </a:t>
+            </a:r>
+            <a:r>
+              <a:rPr lang="en-US" baseline="0" dirty="0" err="1" smtClean="0"/>
+              <a:t>sich</a:t>
+            </a:r>
+            <a:r>
+              <a:rPr lang="en-US" baseline="0" dirty="0" smtClean="0"/>
+              <a:t> </a:t>
+            </a:r>
+            <a:r>
+              <a:rPr lang="en-US" baseline="0" dirty="0" err="1" smtClean="0"/>
+              <a:t>diese</a:t>
+            </a:r>
+            <a:r>
+              <a:rPr lang="en-US" baseline="0" dirty="0" smtClean="0"/>
+              <a:t> </a:t>
+            </a:r>
+            <a:r>
+              <a:rPr lang="en-US" baseline="0" dirty="0" err="1" smtClean="0"/>
+              <a:t>mit</a:t>
+            </a:r>
+            <a:r>
+              <a:rPr lang="en-US" baseline="0" dirty="0" smtClean="0"/>
+              <a:t> </a:t>
+            </a:r>
+            <a:r>
+              <a:rPr lang="en-US" baseline="0" dirty="0" err="1" smtClean="0"/>
+              <a:t>regelmaessigen</a:t>
+            </a:r>
+            <a:r>
+              <a:rPr lang="en-US" baseline="0" dirty="0" smtClean="0"/>
+              <a:t> </a:t>
+            </a:r>
+            <a:r>
+              <a:rPr lang="en-US" baseline="0" dirty="0" err="1" smtClean="0"/>
+              <a:t>Gespraechen</a:t>
+            </a:r>
+            <a:r>
+              <a:rPr lang="en-US" baseline="0" dirty="0" smtClean="0"/>
+              <a:t> </a:t>
+            </a:r>
+            <a:r>
+              <a:rPr lang="en-US" baseline="0" dirty="0" err="1" smtClean="0"/>
+              <a:t>zu</a:t>
+            </a:r>
+            <a:r>
+              <a:rPr lang="en-US" baseline="0" dirty="0" smtClean="0"/>
+              <a:t> ca. 80% </a:t>
+            </a:r>
+            <a:r>
+              <a:rPr lang="en-US" baseline="0" dirty="0" err="1" smtClean="0"/>
+              <a:t>klaeren</a:t>
+            </a:r>
+            <a:r>
+              <a:rPr lang="en-US" baseline="0" dirty="0" smtClean="0"/>
+              <a:t> </a:t>
+            </a:r>
+            <a:r>
+              <a:rPr lang="en-US" baseline="0" dirty="0" err="1" smtClean="0"/>
+              <a:t>lassen</a:t>
+            </a:r>
+            <a:r>
+              <a:rPr lang="en-US" baseline="0" dirty="0" smtClean="0"/>
+              <a:t>. </a:t>
+            </a:r>
+            <a:r>
+              <a:rPr lang="en-US" baseline="0" dirty="0" err="1" smtClean="0"/>
+              <a:t>Weiters</a:t>
+            </a:r>
+            <a:r>
+              <a:rPr lang="en-US" baseline="0" dirty="0" smtClean="0"/>
+              <a:t> </a:t>
+            </a:r>
+            <a:r>
+              <a:rPr lang="en-US" baseline="0" dirty="0" err="1" smtClean="0"/>
+              <a:t>hatten</a:t>
+            </a:r>
+            <a:r>
+              <a:rPr lang="en-US" baseline="0" dirty="0" smtClean="0"/>
+              <a:t> </a:t>
+            </a:r>
+            <a:r>
+              <a:rPr lang="en-US" baseline="0" dirty="0" err="1" smtClean="0"/>
+              <a:t>wir</a:t>
+            </a:r>
+            <a:r>
+              <a:rPr lang="en-US" baseline="0" dirty="0" smtClean="0"/>
+              <a:t> in </a:t>
+            </a:r>
+            <a:r>
+              <a:rPr lang="en-US" baseline="0" dirty="0" err="1" smtClean="0"/>
+              <a:t>unserem</a:t>
+            </a:r>
+            <a:r>
+              <a:rPr lang="en-US" baseline="0" dirty="0" smtClean="0"/>
+              <a:t> Art-Department </a:t>
+            </a:r>
+            <a:r>
+              <a:rPr lang="en-US" baseline="0" dirty="0" err="1" smtClean="0"/>
+              <a:t>einige</a:t>
+            </a:r>
+            <a:r>
+              <a:rPr lang="en-US" baseline="0" dirty="0" smtClean="0"/>
+              <a:t> </a:t>
+            </a:r>
+            <a:r>
+              <a:rPr lang="en-US" baseline="0" dirty="0" err="1" smtClean="0"/>
+              <a:t>krankheits</a:t>
+            </a:r>
+            <a:r>
+              <a:rPr lang="en-US" baseline="0" dirty="0" smtClean="0"/>
+              <a:t>- und </a:t>
+            </a:r>
+            <a:r>
+              <a:rPr lang="en-US" baseline="0" dirty="0" err="1" smtClean="0"/>
+              <a:t>durch</a:t>
+            </a:r>
+            <a:r>
+              <a:rPr lang="en-US" baseline="0" dirty="0" smtClean="0"/>
+              <a:t> </a:t>
+            </a:r>
+            <a:r>
+              <a:rPr lang="en-US" baseline="0" dirty="0" err="1" smtClean="0"/>
+              <a:t>anderweitige</a:t>
+            </a:r>
+            <a:r>
+              <a:rPr lang="en-US" baseline="0" dirty="0" smtClean="0"/>
+              <a:t> </a:t>
+            </a:r>
+            <a:r>
+              <a:rPr lang="en-US" baseline="0" dirty="0" err="1" smtClean="0"/>
+              <a:t>Arbeit</a:t>
+            </a:r>
+            <a:r>
+              <a:rPr lang="en-US" baseline="0" dirty="0" smtClean="0"/>
+              <a:t> </a:t>
+            </a:r>
+            <a:r>
+              <a:rPr lang="en-US" baseline="0" dirty="0" err="1" smtClean="0"/>
+              <a:t>bedingte</a:t>
+            </a:r>
+            <a:r>
+              <a:rPr lang="en-US" baseline="0" dirty="0" smtClean="0"/>
+              <a:t> </a:t>
+            </a:r>
+            <a:r>
+              <a:rPr lang="en-US" baseline="0" dirty="0" err="1" smtClean="0"/>
+              <a:t>Ausfaelle</a:t>
+            </a:r>
+            <a:r>
+              <a:rPr lang="en-US" baseline="0" dirty="0" smtClean="0"/>
+              <a:t>, </a:t>
+            </a:r>
+            <a:r>
+              <a:rPr lang="en-US" baseline="0" dirty="0" err="1" smtClean="0"/>
+              <a:t>doch</a:t>
+            </a:r>
+            <a:r>
+              <a:rPr lang="en-US" baseline="0" dirty="0" smtClean="0"/>
+              <a:t> die </a:t>
+            </a:r>
+            <a:r>
+              <a:rPr lang="en-US" baseline="0" dirty="0" err="1" smtClean="0"/>
+              <a:t>halten</a:t>
+            </a:r>
+            <a:r>
+              <a:rPr lang="en-US" baseline="0" dirty="0" smtClean="0"/>
+              <a:t> </a:t>
+            </a:r>
+            <a:r>
+              <a:rPr lang="en-US" baseline="0" dirty="0" err="1" smtClean="0"/>
+              <a:t>sich</a:t>
+            </a:r>
+            <a:r>
+              <a:rPr lang="en-US" baseline="0" dirty="0" smtClean="0"/>
+              <a:t> </a:t>
+            </a:r>
+            <a:r>
+              <a:rPr lang="en-US" baseline="0" dirty="0" err="1" smtClean="0"/>
+              <a:t>bisher</a:t>
+            </a:r>
+            <a:r>
+              <a:rPr lang="en-US" baseline="0" dirty="0" smtClean="0"/>
+              <a:t> </a:t>
+            </a:r>
+            <a:r>
+              <a:rPr lang="en-US" baseline="0" dirty="0" err="1" smtClean="0"/>
+              <a:t>noch</a:t>
+            </a:r>
+            <a:r>
+              <a:rPr lang="en-US" baseline="0" dirty="0" smtClean="0"/>
+              <a:t> in </a:t>
+            </a:r>
+            <a:r>
+              <a:rPr lang="en-US" baseline="0" dirty="0" err="1" smtClean="0"/>
+              <a:t>dem</a:t>
+            </a:r>
+            <a:r>
+              <a:rPr lang="en-US" baseline="0" dirty="0" smtClean="0"/>
+              <a:t> </a:t>
+            </a:r>
+            <a:r>
+              <a:rPr lang="en-US" baseline="0" dirty="0" err="1" smtClean="0"/>
+              <a:t>zuvor</a:t>
+            </a:r>
+            <a:r>
+              <a:rPr lang="en-US" baseline="0" dirty="0" smtClean="0"/>
+              <a:t> </a:t>
+            </a:r>
+            <a:r>
+              <a:rPr lang="en-US" baseline="0" dirty="0" err="1" smtClean="0"/>
+              <a:t>miteingerechneten</a:t>
+            </a:r>
+            <a:r>
+              <a:rPr lang="en-US" baseline="0" dirty="0" smtClean="0"/>
+              <a:t> </a:t>
+            </a:r>
+            <a:r>
+              <a:rPr lang="en-US" baseline="0" dirty="0" err="1" smtClean="0"/>
+              <a:t>Rahmen</a:t>
+            </a:r>
+            <a:r>
+              <a:rPr lang="en-US" baseline="0" dirty="0" smtClean="0"/>
+              <a:t>. </a:t>
+            </a:r>
+            <a:r>
+              <a:rPr lang="en-US" baseline="0" dirty="0" err="1" smtClean="0"/>
+              <a:t>Dennoch</a:t>
+            </a:r>
+            <a:r>
+              <a:rPr lang="en-US" baseline="0" dirty="0" smtClean="0"/>
+              <a:t> </a:t>
+            </a:r>
+            <a:r>
+              <a:rPr lang="en-US" baseline="0" dirty="0" err="1" smtClean="0"/>
+              <a:t>wurde</a:t>
+            </a:r>
+            <a:r>
+              <a:rPr lang="en-US" baseline="0" dirty="0" smtClean="0"/>
+              <a:t> </a:t>
+            </a:r>
+            <a:r>
+              <a:rPr lang="en-US" baseline="0" dirty="0" err="1" smtClean="0"/>
+              <a:t>diese</a:t>
+            </a:r>
+            <a:r>
+              <a:rPr lang="en-US" baseline="0" dirty="0" smtClean="0"/>
+              <a:t> in </a:t>
+            </a:r>
+            <a:r>
+              <a:rPr lang="en-US" baseline="0" dirty="0" err="1" smtClean="0"/>
+              <a:t>einzelnen</a:t>
+            </a:r>
+            <a:r>
+              <a:rPr lang="en-US" baseline="0" dirty="0" smtClean="0"/>
+              <a:t> </a:t>
+            </a:r>
+            <a:r>
+              <a:rPr lang="en-US" baseline="0" dirty="0" err="1" smtClean="0"/>
+              <a:t>Gespraechen</a:t>
+            </a:r>
+            <a:r>
+              <a:rPr lang="en-US" baseline="0" dirty="0" smtClean="0"/>
+              <a:t> </a:t>
+            </a:r>
+            <a:r>
+              <a:rPr lang="en-US" baseline="0" dirty="0" err="1" smtClean="0"/>
+              <a:t>bereits</a:t>
+            </a:r>
+            <a:r>
+              <a:rPr lang="en-US" baseline="0" dirty="0" smtClean="0"/>
+              <a:t> </a:t>
+            </a:r>
+            <a:r>
+              <a:rPr lang="en-US" baseline="0" dirty="0" err="1" smtClean="0"/>
+              <a:t>angesprochen</a:t>
+            </a:r>
+            <a:r>
+              <a:rPr lang="en-US" baseline="0" dirty="0" smtClean="0"/>
+              <a:t>, </a:t>
+            </a:r>
+            <a:r>
+              <a:rPr lang="en-US" baseline="0" dirty="0" err="1" smtClean="0"/>
+              <a:t>damit</a:t>
+            </a:r>
+            <a:r>
+              <a:rPr lang="en-US" baseline="0" dirty="0" smtClean="0"/>
+              <a:t> </a:t>
+            </a:r>
+            <a:r>
+              <a:rPr lang="en-US" baseline="0" dirty="0" err="1" smtClean="0"/>
+              <a:t>sich</a:t>
+            </a:r>
+            <a:r>
+              <a:rPr lang="en-US" baseline="0" dirty="0" smtClean="0"/>
+              <a:t> </a:t>
+            </a:r>
+            <a:r>
+              <a:rPr lang="en-US" baseline="0" dirty="0" err="1" smtClean="0"/>
+              <a:t>daraus</a:t>
+            </a:r>
+            <a:r>
+              <a:rPr lang="en-US" baseline="0" dirty="0" smtClean="0"/>
+              <a:t> </a:t>
+            </a:r>
+            <a:r>
+              <a:rPr lang="en-US" baseline="0" dirty="0" err="1" smtClean="0"/>
+              <a:t>kein</a:t>
+            </a:r>
+            <a:r>
+              <a:rPr lang="en-US" baseline="0" dirty="0" smtClean="0"/>
+              <a:t> Problem in </a:t>
+            </a:r>
+            <a:r>
+              <a:rPr lang="en-US" baseline="0" dirty="0" err="1" smtClean="0"/>
+              <a:t>Zukunft</a:t>
+            </a:r>
+            <a:r>
+              <a:rPr lang="en-US" baseline="0" dirty="0" smtClean="0"/>
+              <a:t> </a:t>
+            </a:r>
+            <a:r>
+              <a:rPr lang="en-US" baseline="0" dirty="0" err="1" smtClean="0"/>
+              <a:t>ergibt</a:t>
+            </a:r>
+            <a:r>
+              <a:rPr lang="en-US" baseline="0" dirty="0" smtClean="0"/>
+              <a:t>.</a:t>
+            </a:r>
+            <a:endParaRPr lang="de-DE" dirty="0"/>
+          </a:p>
+        </p:txBody>
+      </p:sp>
+      <p:sp>
+        <p:nvSpPr>
+          <p:cNvPr id="4" name="Foliennummernplatzhalter 3"/>
+          <p:cNvSpPr>
+            <a:spLocks noGrp="1"/>
+          </p:cNvSpPr>
+          <p:nvPr>
+            <p:ph type="sldNum" sz="quarter" idx="10"/>
+          </p:nvPr>
+        </p:nvSpPr>
+        <p:spPr/>
+        <p:txBody>
+          <a:bodyPr/>
+          <a:lstStyle/>
+          <a:p>
+            <a:fld id="{4D56AC9C-3557-4516-B20A-3092AF400081}" type="slidenum">
+              <a:rPr lang="de-DE" smtClean="0"/>
+              <a:t>3</a:t>
+            </a:fld>
+            <a:endParaRPr lang="de-DE"/>
+          </a:p>
+        </p:txBody>
+      </p:sp>
+    </p:spTree>
+    <p:extLst>
+      <p:ext uri="{BB962C8B-B14F-4D97-AF65-F5344CB8AC3E}">
+        <p14:creationId xmlns:p14="http://schemas.microsoft.com/office/powerpoint/2010/main" val="1918564868"/>
       </p:ext>
     </p:extLst>
   </p:cSld>
@@ -8924,7 +9400,7 @@
         </p:blipFill>
         <p:spPr>
           <a:xfrm>
-            <a:off x="179512" y="123478"/>
+            <a:off x="154953" y="123478"/>
             <a:ext cx="8826157" cy="4948014"/>
           </a:xfrm>
           <a:prstGeom prst="rect">
@@ -10195,325 +10671,21 @@
           <a:p>
             <a:pPr algn="ctr"/>
             <a:r>
-              <a:rPr lang="en-US" dirty="0" smtClean="0">
-                <a:solidFill>
-                  <a:schemeClr val="tx2">
-                    <a:lumMod val="20000"/>
-                    <a:lumOff val="80000"/>
-                  </a:schemeClr>
-                </a:solidFill>
+              <a:rPr lang="en-GB" dirty="0">
                 <a:latin typeface="MV Boli" panose="02000500030200090000" pitchFamily="2" charset="0"/>
                 <a:cs typeface="MV Boli" panose="02000500030200090000" pitchFamily="2" charset="0"/>
               </a:rPr>
-              <a:t>Die </a:t>
-            </a:r>
-            <a:r>
-              <a:rPr lang="en-US" dirty="0" err="1" smtClean="0">
-                <a:solidFill>
-                  <a:schemeClr val="tx2">
-                    <a:lumMod val="20000"/>
-                    <a:lumOff val="80000"/>
-                  </a:schemeClr>
-                </a:solidFill>
+              <a:t>Voodoo is a 3D platformer for lovers of the occult with minimized </a:t>
+            </a:r>
+            <a:r>
+              <a:rPr lang="en-GB" dirty="0" smtClean="0">
                 <a:latin typeface="MV Boli" panose="02000500030200090000" pitchFamily="2" charset="0"/>
                 <a:cs typeface="MV Boli" panose="02000500030200090000" pitchFamily="2" charset="0"/>
               </a:rPr>
-              <a:t>kleine</a:t>
-            </a:r>
-            <a:r>
-              <a:rPr lang="en-US" dirty="0" smtClean="0">
-                <a:solidFill>
-                  <a:schemeClr val="tx2">
-                    <a:lumMod val="20000"/>
-                    <a:lumOff val="80000"/>
-                  </a:schemeClr>
-                </a:solidFill>
-                <a:latin typeface="MV Boli" panose="02000500030200090000" pitchFamily="2" charset="0"/>
-                <a:cs typeface="MV Boli" panose="02000500030200090000" pitchFamily="2" charset="0"/>
-              </a:rPr>
-              <a:t> Voodoo-</a:t>
-            </a:r>
-            <a:r>
-              <a:rPr lang="en-US" dirty="0" err="1" smtClean="0">
-                <a:solidFill>
-                  <a:schemeClr val="tx2">
-                    <a:lumMod val="20000"/>
-                    <a:lumOff val="80000"/>
-                  </a:schemeClr>
-                </a:solidFill>
-                <a:latin typeface="MV Boli" panose="02000500030200090000" pitchFamily="2" charset="0"/>
-                <a:cs typeface="MV Boli" panose="02000500030200090000" pitchFamily="2" charset="0"/>
-              </a:rPr>
-              <a:t>Puppe</a:t>
-            </a:r>
-            <a:r>
-              <a:rPr lang="en-US" dirty="0" smtClean="0">
-                <a:solidFill>
-                  <a:schemeClr val="tx2">
-                    <a:lumMod val="20000"/>
-                    <a:lumOff val="80000"/>
-                  </a:schemeClr>
-                </a:solidFill>
-                <a:latin typeface="MV Boli" panose="02000500030200090000" pitchFamily="2" charset="0"/>
-                <a:cs typeface="MV Boli" panose="02000500030200090000" pitchFamily="2" charset="0"/>
-              </a:rPr>
-              <a:t> </a:t>
-            </a:r>
-            <a:r>
-              <a:rPr lang="en-US" dirty="0" err="1" smtClean="0">
-                <a:solidFill>
-                  <a:schemeClr val="tx2">
-                    <a:lumMod val="20000"/>
-                    <a:lumOff val="80000"/>
-                  </a:schemeClr>
-                </a:solidFill>
-                <a:latin typeface="MV Boli" panose="02000500030200090000" pitchFamily="2" charset="0"/>
-                <a:cs typeface="MV Boli" panose="02000500030200090000" pitchFamily="2" charset="0"/>
-              </a:rPr>
-              <a:t>ist</a:t>
-            </a:r>
-            <a:r>
-              <a:rPr lang="en-US" dirty="0" smtClean="0">
-                <a:solidFill>
-                  <a:schemeClr val="tx2">
-                    <a:lumMod val="20000"/>
-                    <a:lumOff val="80000"/>
-                  </a:schemeClr>
-                </a:solidFill>
-                <a:latin typeface="MV Boli" panose="02000500030200090000" pitchFamily="2" charset="0"/>
-                <a:cs typeface="MV Boli" panose="02000500030200090000" pitchFamily="2" charset="0"/>
-              </a:rPr>
-              <a:t> </a:t>
-            </a:r>
-            <a:r>
-              <a:rPr lang="en-US" dirty="0" err="1" smtClean="0">
-                <a:solidFill>
-                  <a:schemeClr val="tx2">
-                    <a:lumMod val="20000"/>
-                    <a:lumOff val="80000"/>
-                  </a:schemeClr>
-                </a:solidFill>
-                <a:latin typeface="MV Boli" panose="02000500030200090000" pitchFamily="2" charset="0"/>
-                <a:cs typeface="MV Boli" panose="02000500030200090000" pitchFamily="2" charset="0"/>
-              </a:rPr>
-              <a:t>zum</a:t>
-            </a:r>
-            <a:r>
-              <a:rPr lang="en-US" dirty="0" smtClean="0">
-                <a:solidFill>
-                  <a:schemeClr val="tx2">
-                    <a:lumMod val="20000"/>
-                    <a:lumOff val="80000"/>
-                  </a:schemeClr>
-                </a:solidFill>
-                <a:latin typeface="MV Boli" panose="02000500030200090000" pitchFamily="2" charset="0"/>
-                <a:cs typeface="MV Boli" panose="02000500030200090000" pitchFamily="2" charset="0"/>
-              </a:rPr>
-              <a:t> </a:t>
-            </a:r>
-            <a:r>
-              <a:rPr lang="en-US" dirty="0" err="1" smtClean="0">
-                <a:solidFill>
-                  <a:schemeClr val="tx2">
-                    <a:lumMod val="20000"/>
-                    <a:lumOff val="80000"/>
-                  </a:schemeClr>
-                </a:solidFill>
-                <a:latin typeface="MV Boli" panose="02000500030200090000" pitchFamily="2" charset="0"/>
-                <a:cs typeface="MV Boli" panose="02000500030200090000" pitchFamily="2" charset="0"/>
-              </a:rPr>
-              <a:t>Leben</a:t>
-            </a:r>
-            <a:r>
-              <a:rPr lang="en-US" dirty="0" smtClean="0">
-                <a:solidFill>
-                  <a:schemeClr val="tx2">
-                    <a:lumMod val="20000"/>
-                    <a:lumOff val="80000"/>
-                  </a:schemeClr>
-                </a:solidFill>
-                <a:latin typeface="MV Boli" panose="02000500030200090000" pitchFamily="2" charset="0"/>
-                <a:cs typeface="MV Boli" panose="02000500030200090000" pitchFamily="2" charset="0"/>
-              </a:rPr>
-              <a:t> </a:t>
-            </a:r>
-            <a:r>
-              <a:rPr lang="en-US" dirty="0" err="1" smtClean="0">
-                <a:solidFill>
-                  <a:schemeClr val="tx2">
-                    <a:lumMod val="20000"/>
-                    <a:lumOff val="80000"/>
-                  </a:schemeClr>
-                </a:solidFill>
-                <a:latin typeface="MV Boli" panose="02000500030200090000" pitchFamily="2" charset="0"/>
-                <a:cs typeface="MV Boli" panose="02000500030200090000" pitchFamily="2" charset="0"/>
-              </a:rPr>
-              <a:t>erwacht</a:t>
-            </a:r>
-            <a:r>
-              <a:rPr lang="en-US" dirty="0" smtClean="0">
-                <a:solidFill>
-                  <a:schemeClr val="tx2">
-                    <a:lumMod val="20000"/>
-                    <a:lumOff val="80000"/>
-                  </a:schemeClr>
-                </a:solidFill>
-                <a:latin typeface="MV Boli" panose="02000500030200090000" pitchFamily="2" charset="0"/>
-                <a:cs typeface="MV Boli" panose="02000500030200090000" pitchFamily="2" charset="0"/>
-              </a:rPr>
-              <a:t> und </a:t>
-            </a:r>
-            <a:r>
-              <a:rPr lang="en-US" dirty="0" err="1" smtClean="0">
-                <a:solidFill>
-                  <a:schemeClr val="tx2">
-                    <a:lumMod val="20000"/>
-                    <a:lumOff val="80000"/>
-                  </a:schemeClr>
-                </a:solidFill>
-                <a:latin typeface="MV Boli" panose="02000500030200090000" pitchFamily="2" charset="0"/>
-                <a:cs typeface="MV Boli" panose="02000500030200090000" pitchFamily="2" charset="0"/>
-              </a:rPr>
-              <a:t>versucht</a:t>
-            </a:r>
-            <a:r>
-              <a:rPr lang="en-US" dirty="0" smtClean="0">
-                <a:solidFill>
-                  <a:schemeClr val="tx2">
-                    <a:lumMod val="20000"/>
-                    <a:lumOff val="80000"/>
-                  </a:schemeClr>
-                </a:solidFill>
-                <a:latin typeface="MV Boli" panose="02000500030200090000" pitchFamily="2" charset="0"/>
-                <a:cs typeface="MV Boli" panose="02000500030200090000" pitchFamily="2" charset="0"/>
-              </a:rPr>
-              <a:t> nun </a:t>
-            </a:r>
-            <a:r>
-              <a:rPr lang="en-US" dirty="0" err="1" smtClean="0">
-                <a:solidFill>
-                  <a:schemeClr val="tx2">
-                    <a:lumMod val="20000"/>
-                    <a:lumOff val="80000"/>
-                  </a:schemeClr>
-                </a:solidFill>
-                <a:latin typeface="MV Boli" panose="02000500030200090000" pitchFamily="2" charset="0"/>
-                <a:cs typeface="MV Boli" panose="02000500030200090000" pitchFamily="2" charset="0"/>
-              </a:rPr>
-              <a:t>aus</a:t>
-            </a:r>
-            <a:r>
-              <a:rPr lang="en-US" dirty="0" smtClean="0">
-                <a:solidFill>
-                  <a:schemeClr val="tx2">
-                    <a:lumMod val="20000"/>
-                    <a:lumOff val="80000"/>
-                  </a:schemeClr>
-                </a:solidFill>
-                <a:latin typeface="MV Boli" panose="02000500030200090000" pitchFamily="2" charset="0"/>
-                <a:cs typeface="MV Boli" panose="02000500030200090000" pitchFamily="2" charset="0"/>
-              </a:rPr>
-              <a:t> </a:t>
-            </a:r>
-            <a:r>
-              <a:rPr lang="en-US" dirty="0" err="1" smtClean="0">
-                <a:solidFill>
-                  <a:schemeClr val="tx2">
-                    <a:lumMod val="20000"/>
-                    <a:lumOff val="80000"/>
-                  </a:schemeClr>
-                </a:solidFill>
-                <a:latin typeface="MV Boli" panose="02000500030200090000" pitchFamily="2" charset="0"/>
-                <a:cs typeface="MV Boli" panose="02000500030200090000" pitchFamily="2" charset="0"/>
-              </a:rPr>
-              <a:t>dem</a:t>
-            </a:r>
-            <a:r>
-              <a:rPr lang="en-US" dirty="0" smtClean="0">
-                <a:solidFill>
-                  <a:schemeClr val="tx2">
-                    <a:lumMod val="20000"/>
-                    <a:lumOff val="80000"/>
-                  </a:schemeClr>
-                </a:solidFill>
-                <a:latin typeface="MV Boli" panose="02000500030200090000" pitchFamily="2" charset="0"/>
-                <a:cs typeface="MV Boli" panose="02000500030200090000" pitchFamily="2" charset="0"/>
-              </a:rPr>
-              <a:t> </a:t>
-            </a:r>
-            <a:r>
-              <a:rPr lang="en-US" dirty="0" err="1" smtClean="0">
-                <a:solidFill>
-                  <a:schemeClr val="tx2">
-                    <a:lumMod val="20000"/>
-                    <a:lumOff val="80000"/>
-                  </a:schemeClr>
-                </a:solidFill>
-                <a:latin typeface="MV Boli" panose="02000500030200090000" pitchFamily="2" charset="0"/>
-                <a:cs typeface="MV Boli" panose="02000500030200090000" pitchFamily="2" charset="0"/>
-              </a:rPr>
-              <a:t>unterirdischen</a:t>
-            </a:r>
-            <a:r>
-              <a:rPr lang="en-US" dirty="0" smtClean="0">
-                <a:solidFill>
-                  <a:schemeClr val="tx2">
-                    <a:lumMod val="20000"/>
-                    <a:lumOff val="80000"/>
-                  </a:schemeClr>
-                </a:solidFill>
-                <a:latin typeface="MV Boli" panose="02000500030200090000" pitchFamily="2" charset="0"/>
-                <a:cs typeface="MV Boli" panose="02000500030200090000" pitchFamily="2" charset="0"/>
-              </a:rPr>
-              <a:t> Bunker </a:t>
-            </a:r>
-            <a:r>
-              <a:rPr lang="en-US" dirty="0" err="1" smtClean="0">
-                <a:solidFill>
-                  <a:schemeClr val="tx2">
-                    <a:lumMod val="20000"/>
-                    <a:lumOff val="80000"/>
-                  </a:schemeClr>
-                </a:solidFill>
-                <a:latin typeface="MV Boli" panose="02000500030200090000" pitchFamily="2" charset="0"/>
-                <a:cs typeface="MV Boli" panose="02000500030200090000" pitchFamily="2" charset="0"/>
-              </a:rPr>
-              <a:t>zu</a:t>
-            </a:r>
-            <a:r>
-              <a:rPr lang="en-US" dirty="0" smtClean="0">
-                <a:solidFill>
-                  <a:schemeClr val="tx2">
-                    <a:lumMod val="20000"/>
-                    <a:lumOff val="80000"/>
-                  </a:schemeClr>
-                </a:solidFill>
-                <a:latin typeface="MV Boli" panose="02000500030200090000" pitchFamily="2" charset="0"/>
-                <a:cs typeface="MV Boli" panose="02000500030200090000" pitchFamily="2" charset="0"/>
-              </a:rPr>
-              <a:t> </a:t>
-            </a:r>
-            <a:r>
-              <a:rPr lang="en-US" dirty="0" err="1" smtClean="0">
-                <a:solidFill>
-                  <a:schemeClr val="tx2">
-                    <a:lumMod val="20000"/>
-                    <a:lumOff val="80000"/>
-                  </a:schemeClr>
-                </a:solidFill>
-                <a:latin typeface="MV Boli" panose="02000500030200090000" pitchFamily="2" charset="0"/>
-                <a:cs typeface="MV Boli" panose="02000500030200090000" pitchFamily="2" charset="0"/>
-              </a:rPr>
-              <a:t>fliehen</a:t>
-            </a:r>
-            <a:r>
-              <a:rPr lang="en-US" dirty="0" smtClean="0">
-                <a:solidFill>
-                  <a:schemeClr val="tx2">
-                    <a:lumMod val="20000"/>
-                    <a:lumOff val="80000"/>
-                  </a:schemeClr>
-                </a:solidFill>
+              <a:t>stealth and puzzle-elements</a:t>
+            </a:r>
+            <a:r>
+              <a:rPr lang="en-GB" dirty="0">
                 <a:latin typeface="MV Boli" panose="02000500030200090000" pitchFamily="2" charset="0"/>
                 <a:cs typeface="MV Boli" panose="02000500030200090000" pitchFamily="2" charset="0"/>
               </a:rPr>
@@ -10964,7 +11136,7 @@
           <p:nvPr/>
         </p:nvPicPr>
         <p:blipFill>
-          <a:blip r:embed="rId2" cstate="print">
+          <a:blip r:embed="rId3" cstate="print">
             <a:extLst>
               <a:ext uri="{28A0092B-C50C-407E-A947-70E740481C1C}">
                 <a14:useLocalDpi xmlns:a14="http://schemas.microsoft.com/office/drawing/2010/main" val="0"/>
@@ -11353,7 +11525,7 @@
           <p:nvPr/>
         </p:nvPicPr>
         <p:blipFill>
-          <a:blip r:embed="rId3" cstate="print">
+          <a:blip r:embed="rId4" cstate="print">
             <a:extLst>
               <a:ext uri="{28A0092B-C50C-407E-A947-70E740481C1C}">
                 <a14:useLocalDpi xmlns:a14="http://schemas.microsoft.com/office/drawing/2010/main" val="0"/>

</xml_diff>